<commit_message>
Added software diagrams for report
</commit_message>
<xml_diff>
--- a/Reports/Graphics/Dataflow Diagram.pptx
+++ b/Reports/Graphics/Dataflow Diagram.pptx
@@ -6,6 +6,7 @@
   </p:sldMasterIdLst>
   <p:sldIdLst>
     <p:sldId id="256" r:id="rId2"/>
+    <p:sldId id="257" r:id="rId3"/>
   </p:sldIdLst>
   <p:sldSz cx="9144000" cy="6858000" type="screen4x3"/>
   <p:notesSz cx="6858000" cy="9144000"/>
@@ -289,7 +290,7 @@
             <a:fld id="{1D8BD707-D9CF-40AE-B4C6-C98DA3205C09}" type="datetimeFigureOut">
               <a:rPr lang="en-US" smtClean="0"/>
               <a:pPr/>
-              <a:t>5/22/2015</a:t>
+              <a:t>8/14/2015</a:t>
             </a:fld>
             <a:endParaRPr lang="en-US"/>
           </a:p>
@@ -456,7 +457,7 @@
             <a:fld id="{1D8BD707-D9CF-40AE-B4C6-C98DA3205C09}" type="datetimeFigureOut">
               <a:rPr lang="en-US" smtClean="0"/>
               <a:pPr/>
-              <a:t>5/22/2015</a:t>
+              <a:t>8/14/2015</a:t>
             </a:fld>
             <a:endParaRPr lang="en-US"/>
           </a:p>
@@ -633,7 +634,7 @@
             <a:fld id="{1D8BD707-D9CF-40AE-B4C6-C98DA3205C09}" type="datetimeFigureOut">
               <a:rPr lang="en-US" smtClean="0"/>
               <a:pPr/>
-              <a:t>5/22/2015</a:t>
+              <a:t>8/14/2015</a:t>
             </a:fld>
             <a:endParaRPr lang="en-US"/>
           </a:p>
@@ -800,7 +801,7 @@
             <a:fld id="{1D8BD707-D9CF-40AE-B4C6-C98DA3205C09}" type="datetimeFigureOut">
               <a:rPr lang="en-US" smtClean="0"/>
               <a:pPr/>
-              <a:t>5/22/2015</a:t>
+              <a:t>8/14/2015</a:t>
             </a:fld>
             <a:endParaRPr lang="en-US"/>
           </a:p>
@@ -1043,7 +1044,7 @@
             <a:fld id="{1D8BD707-D9CF-40AE-B4C6-C98DA3205C09}" type="datetimeFigureOut">
               <a:rPr lang="en-US" smtClean="0"/>
               <a:pPr/>
-              <a:t>5/22/2015</a:t>
+              <a:t>8/14/2015</a:t>
             </a:fld>
             <a:endParaRPr lang="en-US"/>
           </a:p>
@@ -1328,7 +1329,7 @@
             <a:fld id="{1D8BD707-D9CF-40AE-B4C6-C98DA3205C09}" type="datetimeFigureOut">
               <a:rPr lang="en-US" smtClean="0"/>
               <a:pPr/>
-              <a:t>5/22/2015</a:t>
+              <a:t>8/14/2015</a:t>
             </a:fld>
             <a:endParaRPr lang="en-US"/>
           </a:p>
@@ -1747,7 +1748,7 @@
             <a:fld id="{1D8BD707-D9CF-40AE-B4C6-C98DA3205C09}" type="datetimeFigureOut">
               <a:rPr lang="en-US" smtClean="0"/>
               <a:pPr/>
-              <a:t>5/22/2015</a:t>
+              <a:t>8/14/2015</a:t>
             </a:fld>
             <a:endParaRPr lang="en-US"/>
           </a:p>
@@ -1862,7 +1863,7 @@
             <a:fld id="{1D8BD707-D9CF-40AE-B4C6-C98DA3205C09}" type="datetimeFigureOut">
               <a:rPr lang="en-US" smtClean="0"/>
               <a:pPr/>
-              <a:t>5/22/2015</a:t>
+              <a:t>8/14/2015</a:t>
             </a:fld>
             <a:endParaRPr lang="en-US"/>
           </a:p>
@@ -1954,7 +1955,7 @@
             <a:fld id="{1D8BD707-D9CF-40AE-B4C6-C98DA3205C09}" type="datetimeFigureOut">
               <a:rPr lang="en-US" smtClean="0"/>
               <a:pPr/>
-              <a:t>5/22/2015</a:t>
+              <a:t>8/14/2015</a:t>
             </a:fld>
             <a:endParaRPr lang="en-US"/>
           </a:p>
@@ -2228,7 +2229,7 @@
             <a:fld id="{1D8BD707-D9CF-40AE-B4C6-C98DA3205C09}" type="datetimeFigureOut">
               <a:rPr lang="en-US" smtClean="0"/>
               <a:pPr/>
-              <a:t>5/22/2015</a:t>
+              <a:t>8/14/2015</a:t>
             </a:fld>
             <a:endParaRPr lang="en-US"/>
           </a:p>
@@ -2478,7 +2479,7 @@
             <a:fld id="{1D8BD707-D9CF-40AE-B4C6-C98DA3205C09}" type="datetimeFigureOut">
               <a:rPr lang="en-US" smtClean="0"/>
               <a:pPr/>
-              <a:t>5/22/2015</a:t>
+              <a:t>8/14/2015</a:t>
             </a:fld>
             <a:endParaRPr lang="en-US"/>
           </a:p>
@@ -2688,7 +2689,7 @@
             <a:fld id="{1D8BD707-D9CF-40AE-B4C6-C98DA3205C09}" type="datetimeFigureOut">
               <a:rPr lang="en-US" smtClean="0"/>
               <a:pPr/>
-              <a:t>5/22/2015</a:t>
+              <a:t>8/14/2015</a:t>
             </a:fld>
             <a:endParaRPr lang="en-US"/>
           </a:p>
@@ -3938,6 +3939,1093 @@
 </p:sld>
 </file>
 
+<file path=ppt/slides/slide2.xml><?xml version="1.0" encoding="utf-8"?>
+<p:sld xmlns:a="http://schemas.openxmlformats.org/drawingml/2006/main" xmlns:r="http://schemas.openxmlformats.org/officeDocument/2006/relationships" xmlns:p="http://schemas.openxmlformats.org/presentationml/2006/main">
+  <p:cSld>
+    <p:spTree>
+      <p:nvGrpSpPr>
+        <p:cNvPr id="1" name=""/>
+        <p:cNvGrpSpPr/>
+        <p:nvPr/>
+      </p:nvGrpSpPr>
+      <p:grpSpPr>
+        <a:xfrm>
+          <a:off x="0" y="0"/>
+          <a:ext cx="0" cy="0"/>
+          <a:chOff x="0" y="0"/>
+          <a:chExt cx="0" cy="0"/>
+        </a:xfrm>
+      </p:grpSpPr>
+      <p:grpSp>
+        <p:nvGrpSpPr>
+          <p:cNvPr id="107" name="Group 106"/>
+          <p:cNvGrpSpPr/>
+          <p:nvPr/>
+        </p:nvGrpSpPr>
+        <p:grpSpPr>
+          <a:xfrm>
+            <a:off x="358140" y="228597"/>
+            <a:ext cx="7369066" cy="5334004"/>
+            <a:chOff x="358140" y="228597"/>
+            <a:chExt cx="7369066" cy="5334004"/>
+          </a:xfrm>
+        </p:grpSpPr>
+        <p:sp>
+          <p:nvSpPr>
+            <p:cNvPr id="5" name="Rectangle 4"/>
+            <p:cNvSpPr/>
+            <p:nvPr/>
+          </p:nvSpPr>
+          <p:spPr>
+            <a:xfrm>
+              <a:off x="3155206" y="4762501"/>
+              <a:ext cx="1905000" cy="533400"/>
+            </a:xfrm>
+            <a:prstGeom prst="rect">
+              <a:avLst/>
+            </a:prstGeom>
+            <a:solidFill>
+              <a:schemeClr val="bg1">
+                <a:lumMod val="95000"/>
+              </a:schemeClr>
+            </a:solidFill>
+            <a:ln>
+              <a:solidFill>
+                <a:schemeClr val="tx1"/>
+              </a:solidFill>
+            </a:ln>
+          </p:spPr>
+          <p:style>
+            <a:lnRef idx="2">
+              <a:schemeClr val="accent1">
+                <a:shade val="50000"/>
+              </a:schemeClr>
+            </a:lnRef>
+            <a:fillRef idx="1">
+              <a:schemeClr val="accent1"/>
+            </a:fillRef>
+            <a:effectRef idx="0">
+              <a:schemeClr val="accent1"/>
+            </a:effectRef>
+            <a:fontRef idx="minor">
+              <a:schemeClr val="lt1"/>
+            </a:fontRef>
+          </p:style>
+          <p:txBody>
+            <a:bodyPr rtlCol="0" anchor="ctr"/>
+            <a:lstStyle/>
+            <a:p>
+              <a:pPr algn="ctr"/>
+              <a:r>
+                <a:rPr lang="en-NZ" dirty="0" err="1" smtClean="0">
+                  <a:solidFill>
+                    <a:sysClr val="windowText" lastClr="000000"/>
+                  </a:solidFill>
+                </a:rPr>
+                <a:t>sensor_core.h</a:t>
+              </a:r>
+              <a:endParaRPr lang="en-NZ" dirty="0">
+                <a:solidFill>
+                  <a:sysClr val="windowText" lastClr="000000"/>
+                </a:solidFill>
+              </a:endParaRPr>
+            </a:p>
+          </p:txBody>
+        </p:sp>
+        <p:sp>
+          <p:nvSpPr>
+            <p:cNvPr id="6" name="Rectangle 5"/>
+            <p:cNvSpPr/>
+            <p:nvPr/>
+          </p:nvSpPr>
+          <p:spPr>
+            <a:xfrm>
+              <a:off x="3139966" y="754114"/>
+              <a:ext cx="1905000" cy="533400"/>
+            </a:xfrm>
+            <a:prstGeom prst="rect">
+              <a:avLst/>
+            </a:prstGeom>
+            <a:solidFill>
+              <a:schemeClr val="bg1">
+                <a:lumMod val="95000"/>
+              </a:schemeClr>
+            </a:solidFill>
+            <a:ln>
+              <a:solidFill>
+                <a:schemeClr val="tx1"/>
+              </a:solidFill>
+            </a:ln>
+          </p:spPr>
+          <p:style>
+            <a:lnRef idx="2">
+              <a:schemeClr val="accent1">
+                <a:shade val="50000"/>
+              </a:schemeClr>
+            </a:lnRef>
+            <a:fillRef idx="1">
+              <a:schemeClr val="accent1"/>
+            </a:fillRef>
+            <a:effectRef idx="0">
+              <a:schemeClr val="accent1"/>
+            </a:effectRef>
+            <a:fontRef idx="minor">
+              <a:schemeClr val="lt1"/>
+            </a:fontRef>
+          </p:style>
+          <p:txBody>
+            <a:bodyPr rtlCol="0" anchor="ctr"/>
+            <a:lstStyle/>
+            <a:p>
+              <a:pPr algn="ctr"/>
+              <a:r>
+                <a:rPr lang="en-NZ" dirty="0" err="1" smtClean="0">
+                  <a:solidFill>
+                    <a:sysClr val="windowText" lastClr="000000"/>
+                  </a:solidFill>
+                </a:rPr>
+                <a:t>RoboX.ino</a:t>
+              </a:r>
+              <a:endParaRPr lang="en-NZ" dirty="0">
+                <a:solidFill>
+                  <a:sysClr val="windowText" lastClr="000000"/>
+                </a:solidFill>
+              </a:endParaRPr>
+            </a:p>
+          </p:txBody>
+        </p:sp>
+        <p:sp>
+          <p:nvSpPr>
+            <p:cNvPr id="7" name="Rectangle 6"/>
+            <p:cNvSpPr/>
+            <p:nvPr/>
+          </p:nvSpPr>
+          <p:spPr>
+            <a:xfrm>
+              <a:off x="3155206" y="3844482"/>
+              <a:ext cx="1905000" cy="533400"/>
+            </a:xfrm>
+            <a:prstGeom prst="rect">
+              <a:avLst/>
+            </a:prstGeom>
+            <a:solidFill>
+              <a:schemeClr val="bg1">
+                <a:lumMod val="95000"/>
+              </a:schemeClr>
+            </a:solidFill>
+            <a:ln>
+              <a:solidFill>
+                <a:schemeClr val="tx1"/>
+              </a:solidFill>
+            </a:ln>
+          </p:spPr>
+          <p:style>
+            <a:lnRef idx="2">
+              <a:schemeClr val="accent1">
+                <a:shade val="50000"/>
+              </a:schemeClr>
+            </a:lnRef>
+            <a:fillRef idx="1">
+              <a:schemeClr val="accent1"/>
+            </a:fillRef>
+            <a:effectRef idx="0">
+              <a:schemeClr val="accent1"/>
+            </a:effectRef>
+            <a:fontRef idx="minor">
+              <a:schemeClr val="lt1"/>
+            </a:fontRef>
+          </p:style>
+          <p:txBody>
+            <a:bodyPr rtlCol="0" anchor="ctr"/>
+            <a:lstStyle/>
+            <a:p>
+              <a:pPr algn="ctr"/>
+              <a:r>
+                <a:rPr lang="en-NZ" dirty="0" err="1" smtClean="0">
+                  <a:solidFill>
+                    <a:sysClr val="windowText" lastClr="000000"/>
+                  </a:solidFill>
+                </a:rPr>
+                <a:t>actuator_core.h</a:t>
+              </a:r>
+              <a:endParaRPr lang="en-NZ" dirty="0">
+                <a:solidFill>
+                  <a:sysClr val="windowText" lastClr="000000"/>
+                </a:solidFill>
+              </a:endParaRPr>
+            </a:p>
+          </p:txBody>
+        </p:sp>
+        <p:sp>
+          <p:nvSpPr>
+            <p:cNvPr id="8" name="Rectangle 7"/>
+            <p:cNvSpPr/>
+            <p:nvPr/>
+          </p:nvSpPr>
+          <p:spPr>
+            <a:xfrm>
+              <a:off x="5515897" y="3857294"/>
+              <a:ext cx="1905000" cy="533400"/>
+            </a:xfrm>
+            <a:prstGeom prst="rect">
+              <a:avLst/>
+            </a:prstGeom>
+            <a:solidFill>
+              <a:schemeClr val="bg1">
+                <a:lumMod val="95000"/>
+              </a:schemeClr>
+            </a:solidFill>
+            <a:ln>
+              <a:solidFill>
+                <a:schemeClr val="tx1"/>
+              </a:solidFill>
+            </a:ln>
+          </p:spPr>
+          <p:style>
+            <a:lnRef idx="2">
+              <a:schemeClr val="accent1">
+                <a:shade val="50000"/>
+              </a:schemeClr>
+            </a:lnRef>
+            <a:fillRef idx="1">
+              <a:schemeClr val="accent1"/>
+            </a:fillRef>
+            <a:effectRef idx="0">
+              <a:schemeClr val="accent1"/>
+            </a:effectRef>
+            <a:fontRef idx="minor">
+              <a:schemeClr val="lt1"/>
+            </a:fontRef>
+          </p:style>
+          <p:txBody>
+            <a:bodyPr rtlCol="0" anchor="ctr"/>
+            <a:lstStyle/>
+            <a:p>
+              <a:pPr algn="ctr"/>
+              <a:r>
+                <a:rPr lang="en-NZ" dirty="0" err="1" smtClean="0">
+                  <a:solidFill>
+                    <a:sysClr val="windowText" lastClr="000000"/>
+                  </a:solidFill>
+                </a:rPr>
+                <a:t>audio_core.h</a:t>
+              </a:r>
+              <a:endParaRPr lang="en-NZ" dirty="0">
+                <a:solidFill>
+                  <a:sysClr val="windowText" lastClr="000000"/>
+                </a:solidFill>
+              </a:endParaRPr>
+            </a:p>
+          </p:txBody>
+        </p:sp>
+        <p:sp>
+          <p:nvSpPr>
+            <p:cNvPr id="9" name="Rectangle 8"/>
+            <p:cNvSpPr/>
+            <p:nvPr/>
+          </p:nvSpPr>
+          <p:spPr>
+            <a:xfrm>
+              <a:off x="510540" y="2285999"/>
+              <a:ext cx="1905000" cy="533400"/>
+            </a:xfrm>
+            <a:prstGeom prst="rect">
+              <a:avLst/>
+            </a:prstGeom>
+            <a:solidFill>
+              <a:schemeClr val="bg1">
+                <a:lumMod val="95000"/>
+              </a:schemeClr>
+            </a:solidFill>
+            <a:ln>
+              <a:solidFill>
+                <a:schemeClr val="tx1"/>
+              </a:solidFill>
+            </a:ln>
+          </p:spPr>
+          <p:style>
+            <a:lnRef idx="2">
+              <a:schemeClr val="accent1">
+                <a:shade val="50000"/>
+              </a:schemeClr>
+            </a:lnRef>
+            <a:fillRef idx="1">
+              <a:schemeClr val="accent1"/>
+            </a:fillRef>
+            <a:effectRef idx="0">
+              <a:schemeClr val="accent1"/>
+            </a:effectRef>
+            <a:fontRef idx="minor">
+              <a:schemeClr val="lt1"/>
+            </a:fontRef>
+          </p:style>
+          <p:txBody>
+            <a:bodyPr rtlCol="0" anchor="ctr"/>
+            <a:lstStyle/>
+            <a:p>
+              <a:pPr algn="ctr"/>
+              <a:r>
+                <a:rPr lang="en-NZ" dirty="0" err="1">
+                  <a:solidFill>
+                    <a:sysClr val="windowText" lastClr="000000"/>
+                  </a:solidFill>
+                </a:rPr>
+                <a:t>c</a:t>
+              </a:r>
+              <a:r>
+                <a:rPr lang="en-NZ" dirty="0" err="1" smtClean="0">
+                  <a:solidFill>
+                    <a:sysClr val="windowText" lastClr="000000"/>
+                  </a:solidFill>
+                </a:rPr>
+                <a:t>onfig.h</a:t>
+              </a:r>
+              <a:endParaRPr lang="en-NZ" dirty="0">
+                <a:solidFill>
+                  <a:sysClr val="windowText" lastClr="000000"/>
+                </a:solidFill>
+              </a:endParaRPr>
+            </a:p>
+          </p:txBody>
+        </p:sp>
+        <p:sp>
+          <p:nvSpPr>
+            <p:cNvPr id="10" name="Rectangle 9"/>
+            <p:cNvSpPr/>
+            <p:nvPr/>
+          </p:nvSpPr>
+          <p:spPr>
+            <a:xfrm>
+              <a:off x="510540" y="3524249"/>
+              <a:ext cx="1905000" cy="533400"/>
+            </a:xfrm>
+            <a:prstGeom prst="rect">
+              <a:avLst/>
+            </a:prstGeom>
+            <a:solidFill>
+              <a:schemeClr val="bg1">
+                <a:lumMod val="95000"/>
+              </a:schemeClr>
+            </a:solidFill>
+            <a:ln>
+              <a:solidFill>
+                <a:schemeClr val="tx1"/>
+              </a:solidFill>
+            </a:ln>
+          </p:spPr>
+          <p:style>
+            <a:lnRef idx="2">
+              <a:schemeClr val="accent1">
+                <a:shade val="50000"/>
+              </a:schemeClr>
+            </a:lnRef>
+            <a:fillRef idx="1">
+              <a:schemeClr val="accent1"/>
+            </a:fillRef>
+            <a:effectRef idx="0">
+              <a:schemeClr val="accent1"/>
+            </a:effectRef>
+            <a:fontRef idx="minor">
+              <a:schemeClr val="lt1"/>
+            </a:fontRef>
+          </p:style>
+          <p:txBody>
+            <a:bodyPr rtlCol="0" anchor="ctr"/>
+            <a:lstStyle/>
+            <a:p>
+              <a:pPr algn="ctr"/>
+              <a:r>
+                <a:rPr lang="en-NZ" dirty="0" err="1" smtClean="0">
+                  <a:solidFill>
+                    <a:sysClr val="windowText" lastClr="000000"/>
+                  </a:solidFill>
+                </a:rPr>
+                <a:t>exception_core.h</a:t>
+              </a:r>
+              <a:endParaRPr lang="en-NZ" dirty="0">
+                <a:solidFill>
+                  <a:sysClr val="windowText" lastClr="000000"/>
+                </a:solidFill>
+              </a:endParaRPr>
+            </a:p>
+          </p:txBody>
+        </p:sp>
+        <p:sp>
+          <p:nvSpPr>
+            <p:cNvPr id="11" name="Rectangle 10"/>
+            <p:cNvSpPr/>
+            <p:nvPr/>
+          </p:nvSpPr>
+          <p:spPr>
+            <a:xfrm>
+              <a:off x="5589666" y="2285998"/>
+              <a:ext cx="1905000" cy="533400"/>
+            </a:xfrm>
+            <a:prstGeom prst="rect">
+              <a:avLst/>
+            </a:prstGeom>
+            <a:solidFill>
+              <a:schemeClr val="bg1">
+                <a:lumMod val="95000"/>
+              </a:schemeClr>
+            </a:solidFill>
+            <a:ln>
+              <a:solidFill>
+                <a:schemeClr val="tx1"/>
+              </a:solidFill>
+            </a:ln>
+          </p:spPr>
+          <p:style>
+            <a:lnRef idx="2">
+              <a:schemeClr val="accent1">
+                <a:shade val="50000"/>
+              </a:schemeClr>
+            </a:lnRef>
+            <a:fillRef idx="1">
+              <a:schemeClr val="accent1"/>
+            </a:fillRef>
+            <a:effectRef idx="0">
+              <a:schemeClr val="accent1"/>
+            </a:effectRef>
+            <a:fontRef idx="minor">
+              <a:schemeClr val="lt1"/>
+            </a:fontRef>
+          </p:style>
+          <p:txBody>
+            <a:bodyPr rtlCol="0" anchor="ctr"/>
+            <a:lstStyle/>
+            <a:p>
+              <a:pPr algn="ctr"/>
+              <a:r>
+                <a:rPr lang="en-NZ" dirty="0" err="1" smtClean="0">
+                  <a:solidFill>
+                    <a:sysClr val="windowText" lastClr="000000"/>
+                  </a:solidFill>
+                </a:rPr>
+                <a:t>interrupt_core.h</a:t>
+              </a:r>
+              <a:endParaRPr lang="en-NZ" dirty="0">
+                <a:solidFill>
+                  <a:sysClr val="windowText" lastClr="000000"/>
+                </a:solidFill>
+              </a:endParaRPr>
+            </a:p>
+          </p:txBody>
+        </p:sp>
+        <p:sp>
+          <p:nvSpPr>
+            <p:cNvPr id="14" name="Rectangle 13"/>
+            <p:cNvSpPr/>
+            <p:nvPr/>
+          </p:nvSpPr>
+          <p:spPr>
+            <a:xfrm>
+              <a:off x="358140" y="1828797"/>
+              <a:ext cx="2241332" cy="3733803"/>
+            </a:xfrm>
+            <a:prstGeom prst="rect">
+              <a:avLst/>
+            </a:prstGeom>
+            <a:noFill/>
+            <a:ln>
+              <a:solidFill>
+                <a:schemeClr val="tx1"/>
+              </a:solidFill>
+              <a:prstDash val="dash"/>
+            </a:ln>
+          </p:spPr>
+          <p:style>
+            <a:lnRef idx="2">
+              <a:schemeClr val="accent1">
+                <a:shade val="50000"/>
+              </a:schemeClr>
+            </a:lnRef>
+            <a:fillRef idx="1">
+              <a:schemeClr val="accent1"/>
+            </a:fillRef>
+            <a:effectRef idx="0">
+              <a:schemeClr val="accent1"/>
+            </a:effectRef>
+            <a:fontRef idx="minor">
+              <a:schemeClr val="lt1"/>
+            </a:fontRef>
+          </p:style>
+          <p:txBody>
+            <a:bodyPr rtlCol="0" anchor="t"/>
+            <a:lstStyle/>
+            <a:p>
+              <a:pPr algn="ctr"/>
+              <a:r>
+                <a:rPr lang="en-NZ" dirty="0" smtClean="0">
+                  <a:solidFill>
+                    <a:sysClr val="windowText" lastClr="000000"/>
+                  </a:solidFill>
+                </a:rPr>
+                <a:t>SUPPORT FUNCTIONS</a:t>
+              </a:r>
+              <a:endParaRPr lang="en-NZ" dirty="0">
+                <a:solidFill>
+                  <a:sysClr val="windowText" lastClr="000000"/>
+                </a:solidFill>
+              </a:endParaRPr>
+            </a:p>
+          </p:txBody>
+        </p:sp>
+        <p:sp>
+          <p:nvSpPr>
+            <p:cNvPr id="21" name="Rectangle 20"/>
+            <p:cNvSpPr/>
+            <p:nvPr/>
+          </p:nvSpPr>
+          <p:spPr>
+            <a:xfrm>
+              <a:off x="3152579" y="2285998"/>
+              <a:ext cx="1905000" cy="533400"/>
+            </a:xfrm>
+            <a:prstGeom prst="rect">
+              <a:avLst/>
+            </a:prstGeom>
+            <a:solidFill>
+              <a:schemeClr val="bg1">
+                <a:lumMod val="95000"/>
+              </a:schemeClr>
+            </a:solidFill>
+            <a:ln>
+              <a:solidFill>
+                <a:schemeClr val="tx1"/>
+              </a:solidFill>
+            </a:ln>
+          </p:spPr>
+          <p:style>
+            <a:lnRef idx="2">
+              <a:schemeClr val="accent1">
+                <a:shade val="50000"/>
+              </a:schemeClr>
+            </a:lnRef>
+            <a:fillRef idx="1">
+              <a:schemeClr val="accent1"/>
+            </a:fillRef>
+            <a:effectRef idx="0">
+              <a:schemeClr val="accent1"/>
+            </a:effectRef>
+            <a:fontRef idx="minor">
+              <a:schemeClr val="lt1"/>
+            </a:fontRef>
+          </p:style>
+          <p:txBody>
+            <a:bodyPr rtlCol="0" anchor="ctr"/>
+            <a:lstStyle/>
+            <a:p>
+              <a:pPr algn="ctr"/>
+              <a:r>
+                <a:rPr lang="en-NZ" dirty="0" err="1" smtClean="0">
+                  <a:solidFill>
+                    <a:sysClr val="windowText" lastClr="000000"/>
+                  </a:solidFill>
+                </a:rPr>
+                <a:t>tactics_core.h</a:t>
+              </a:r>
+              <a:endParaRPr lang="en-NZ" dirty="0">
+                <a:solidFill>
+                  <a:sysClr val="windowText" lastClr="000000"/>
+                </a:solidFill>
+              </a:endParaRPr>
+            </a:p>
+          </p:txBody>
+        </p:sp>
+        <p:sp>
+          <p:nvSpPr>
+            <p:cNvPr id="22" name="Rectangle 21"/>
+            <p:cNvSpPr/>
+            <p:nvPr/>
+          </p:nvSpPr>
+          <p:spPr>
+            <a:xfrm>
+              <a:off x="510540" y="4760294"/>
+              <a:ext cx="1905000" cy="533400"/>
+            </a:xfrm>
+            <a:prstGeom prst="rect">
+              <a:avLst/>
+            </a:prstGeom>
+            <a:solidFill>
+              <a:schemeClr val="bg1">
+                <a:lumMod val="95000"/>
+              </a:schemeClr>
+            </a:solidFill>
+            <a:ln>
+              <a:solidFill>
+                <a:schemeClr val="tx1"/>
+              </a:solidFill>
+            </a:ln>
+          </p:spPr>
+          <p:style>
+            <a:lnRef idx="2">
+              <a:schemeClr val="accent1">
+                <a:shade val="50000"/>
+              </a:schemeClr>
+            </a:lnRef>
+            <a:fillRef idx="1">
+              <a:schemeClr val="accent1"/>
+            </a:fillRef>
+            <a:effectRef idx="0">
+              <a:schemeClr val="accent1"/>
+            </a:effectRef>
+            <a:fontRef idx="minor">
+              <a:schemeClr val="lt1"/>
+            </a:fontRef>
+          </p:style>
+          <p:txBody>
+            <a:bodyPr rtlCol="0" anchor="ctr"/>
+            <a:lstStyle/>
+            <a:p>
+              <a:pPr algn="ctr"/>
+              <a:r>
+                <a:rPr lang="en-NZ" dirty="0" err="1" smtClean="0">
+                  <a:solidFill>
+                    <a:sysClr val="windowText" lastClr="000000"/>
+                  </a:solidFill>
+                </a:rPr>
+                <a:t>trig_core.h</a:t>
+              </a:r>
+              <a:endParaRPr lang="en-NZ" dirty="0">
+                <a:solidFill>
+                  <a:sysClr val="windowText" lastClr="000000"/>
+                </a:solidFill>
+              </a:endParaRPr>
+            </a:p>
+          </p:txBody>
+        </p:sp>
+        <p:sp>
+          <p:nvSpPr>
+            <p:cNvPr id="23" name="Rectangle 22"/>
+            <p:cNvSpPr/>
+            <p:nvPr/>
+          </p:nvSpPr>
+          <p:spPr>
+            <a:xfrm>
+              <a:off x="2971801" y="228597"/>
+              <a:ext cx="2304392" cy="1295401"/>
+            </a:xfrm>
+            <a:prstGeom prst="rect">
+              <a:avLst/>
+            </a:prstGeom>
+            <a:noFill/>
+            <a:ln>
+              <a:solidFill>
+                <a:schemeClr val="tx1"/>
+              </a:solidFill>
+              <a:prstDash val="dash"/>
+            </a:ln>
+          </p:spPr>
+          <p:style>
+            <a:lnRef idx="2">
+              <a:schemeClr val="accent1">
+                <a:shade val="50000"/>
+              </a:schemeClr>
+            </a:lnRef>
+            <a:fillRef idx="1">
+              <a:schemeClr val="accent1"/>
+            </a:fillRef>
+            <a:effectRef idx="0">
+              <a:schemeClr val="accent1"/>
+            </a:effectRef>
+            <a:fontRef idx="minor">
+              <a:schemeClr val="lt1"/>
+            </a:fontRef>
+          </p:style>
+          <p:txBody>
+            <a:bodyPr rtlCol="0" anchor="t"/>
+            <a:lstStyle/>
+            <a:p>
+              <a:pPr algn="ctr"/>
+              <a:r>
+                <a:rPr lang="en-NZ" dirty="0" smtClean="0">
+                  <a:solidFill>
+                    <a:sysClr val="windowText" lastClr="000000"/>
+                  </a:solidFill>
+                </a:rPr>
+                <a:t>TOP-LEVEL</a:t>
+              </a:r>
+              <a:endParaRPr lang="en-NZ" dirty="0">
+                <a:solidFill>
+                  <a:sysClr val="windowText" lastClr="000000"/>
+                </a:solidFill>
+              </a:endParaRPr>
+            </a:p>
+          </p:txBody>
+        </p:sp>
+        <p:sp>
+          <p:nvSpPr>
+            <p:cNvPr id="24" name="Rectangle 23"/>
+            <p:cNvSpPr/>
+            <p:nvPr/>
+          </p:nvSpPr>
+          <p:spPr>
+            <a:xfrm>
+              <a:off x="2984414" y="1828798"/>
+              <a:ext cx="4742792" cy="1219199"/>
+            </a:xfrm>
+            <a:prstGeom prst="rect">
+              <a:avLst/>
+            </a:prstGeom>
+            <a:noFill/>
+            <a:ln>
+              <a:solidFill>
+                <a:schemeClr val="tx1"/>
+              </a:solidFill>
+              <a:prstDash val="dash"/>
+            </a:ln>
+          </p:spPr>
+          <p:style>
+            <a:lnRef idx="2">
+              <a:schemeClr val="accent1">
+                <a:shade val="50000"/>
+              </a:schemeClr>
+            </a:lnRef>
+            <a:fillRef idx="1">
+              <a:schemeClr val="accent1"/>
+            </a:fillRef>
+            <a:effectRef idx="0">
+              <a:schemeClr val="accent1"/>
+            </a:effectRef>
+            <a:fontRef idx="minor">
+              <a:schemeClr val="lt1"/>
+            </a:fontRef>
+          </p:style>
+          <p:txBody>
+            <a:bodyPr rtlCol="0" anchor="t"/>
+            <a:lstStyle/>
+            <a:p>
+              <a:pPr algn="r"/>
+              <a:r>
+                <a:rPr lang="en-NZ" dirty="0" smtClean="0">
+                  <a:solidFill>
+                    <a:sysClr val="windowText" lastClr="000000"/>
+                  </a:solidFill>
+                </a:rPr>
+                <a:t>MID-LEVEL  and SCHEDULING</a:t>
+              </a:r>
+              <a:endParaRPr lang="en-NZ" dirty="0">
+                <a:solidFill>
+                  <a:sysClr val="windowText" lastClr="000000"/>
+                </a:solidFill>
+              </a:endParaRPr>
+            </a:p>
+          </p:txBody>
+        </p:sp>
+        <p:sp>
+          <p:nvSpPr>
+            <p:cNvPr id="25" name="Rectangle 24"/>
+            <p:cNvSpPr/>
+            <p:nvPr/>
+          </p:nvSpPr>
+          <p:spPr>
+            <a:xfrm>
+              <a:off x="2980474" y="3352800"/>
+              <a:ext cx="4742792" cy="2209801"/>
+            </a:xfrm>
+            <a:prstGeom prst="rect">
+              <a:avLst/>
+            </a:prstGeom>
+            <a:noFill/>
+            <a:ln>
+              <a:solidFill>
+                <a:schemeClr val="tx1"/>
+              </a:solidFill>
+              <a:prstDash val="dash"/>
+            </a:ln>
+          </p:spPr>
+          <p:style>
+            <a:lnRef idx="2">
+              <a:schemeClr val="accent1">
+                <a:shade val="50000"/>
+              </a:schemeClr>
+            </a:lnRef>
+            <a:fillRef idx="1">
+              <a:schemeClr val="accent1"/>
+            </a:fillRef>
+            <a:effectRef idx="0">
+              <a:schemeClr val="accent1"/>
+            </a:effectRef>
+            <a:fontRef idx="minor">
+              <a:schemeClr val="lt1"/>
+            </a:fontRef>
+          </p:style>
+          <p:txBody>
+            <a:bodyPr rtlCol="0" anchor="t"/>
+            <a:lstStyle/>
+            <a:p>
+              <a:pPr algn="r"/>
+              <a:r>
+                <a:rPr lang="en-NZ" dirty="0" smtClean="0">
+                  <a:solidFill>
+                    <a:sysClr val="windowText" lastClr="000000"/>
+                  </a:solidFill>
+                </a:rPr>
+                <a:t>LOW-LEVEL</a:t>
+              </a:r>
+              <a:endParaRPr lang="en-NZ" dirty="0">
+                <a:solidFill>
+                  <a:sysClr val="windowText" lastClr="000000"/>
+                </a:solidFill>
+              </a:endParaRPr>
+            </a:p>
+          </p:txBody>
+        </p:sp>
+        <p:cxnSp>
+          <p:nvCxnSpPr>
+            <p:cNvPr id="28" name="Straight Arrow Connector 27"/>
+            <p:cNvCxnSpPr>
+              <a:stCxn id="6" idx="2"/>
+              <a:endCxn id="21" idx="0"/>
+            </p:cNvCxnSpPr>
+            <p:nvPr/>
+          </p:nvCxnSpPr>
+          <p:spPr>
+            <a:xfrm>
+              <a:off x="4092466" y="1287514"/>
+              <a:ext cx="12613" cy="998484"/>
+            </a:xfrm>
+            <a:prstGeom prst="straightConnector1">
+              <a:avLst/>
+            </a:prstGeom>
+            <a:ln w="19050">
+              <a:solidFill>
+                <a:schemeClr val="tx1"/>
+              </a:solidFill>
+              <a:tailEnd type="arrow"/>
+            </a:ln>
+          </p:spPr>
+          <p:style>
+            <a:lnRef idx="1">
+              <a:schemeClr val="accent1"/>
+            </a:lnRef>
+            <a:fillRef idx="0">
+              <a:schemeClr val="accent1"/>
+            </a:fillRef>
+            <a:effectRef idx="0">
+              <a:schemeClr val="accent1"/>
+            </a:effectRef>
+            <a:fontRef idx="minor">
+              <a:schemeClr val="tx1"/>
+            </a:fontRef>
+          </p:style>
+        </p:cxnSp>
+        <p:cxnSp>
+          <p:nvCxnSpPr>
+            <p:cNvPr id="31" name="Straight Arrow Connector 30"/>
+            <p:cNvCxnSpPr>
+              <a:stCxn id="21" idx="3"/>
+              <a:endCxn id="11" idx="1"/>
+            </p:cNvCxnSpPr>
+            <p:nvPr/>
+          </p:nvCxnSpPr>
+          <p:spPr>
+            <a:xfrm>
+              <a:off x="5057579" y="2552698"/>
+              <a:ext cx="532087" cy="0"/>
+            </a:xfrm>
+            <a:prstGeom prst="straightConnector1">
+              <a:avLst/>
+            </a:prstGeom>
+            <a:ln w="19050">
+              <a:solidFill>
+                <a:schemeClr val="tx1"/>
+              </a:solidFill>
+              <a:tailEnd type="arrow"/>
+            </a:ln>
+          </p:spPr>
+          <p:style>
+            <a:lnRef idx="1">
+              <a:schemeClr val="accent1"/>
+            </a:lnRef>
+            <a:fillRef idx="0">
+              <a:schemeClr val="accent1"/>
+            </a:fillRef>
+            <a:effectRef idx="0">
+              <a:schemeClr val="accent1"/>
+            </a:effectRef>
+            <a:fontRef idx="minor">
+              <a:schemeClr val="tx1"/>
+            </a:fontRef>
+          </p:style>
+        </p:cxnSp>
+        <p:cxnSp>
+          <p:nvCxnSpPr>
+            <p:cNvPr id="40" name="Elbow Connector 39"/>
+            <p:cNvCxnSpPr>
+              <a:stCxn id="5" idx="1"/>
+              <a:endCxn id="21" idx="1"/>
+            </p:cNvCxnSpPr>
+            <p:nvPr/>
+          </p:nvCxnSpPr>
+          <p:spPr>
+            <a:xfrm rot="10800000">
+              <a:off x="3152580" y="2552699"/>
+              <a:ext cx="2627" cy="2476503"/>
+            </a:xfrm>
+            <a:prstGeom prst="bentConnector3">
+              <a:avLst>
+                <a:gd name="adj1" fmla="val 14023106"/>
+              </a:avLst>
+            </a:prstGeom>
+            <a:ln w="19050">
+              <a:solidFill>
+                <a:schemeClr val="tx1"/>
+              </a:solidFill>
+              <a:tailEnd type="arrow"/>
+            </a:ln>
+          </p:spPr>
+          <p:style>
+            <a:lnRef idx="1">
+              <a:schemeClr val="accent1"/>
+            </a:lnRef>
+            <a:fillRef idx="0">
+              <a:schemeClr val="accent1"/>
+            </a:fillRef>
+            <a:effectRef idx="0">
+              <a:schemeClr val="accent1"/>
+            </a:effectRef>
+            <a:fontRef idx="minor">
+              <a:schemeClr val="tx1"/>
+            </a:fontRef>
+          </p:style>
+        </p:cxnSp>
+        <p:cxnSp>
+          <p:nvCxnSpPr>
+            <p:cNvPr id="71" name="Straight Arrow Connector 70"/>
+            <p:cNvCxnSpPr>
+              <a:stCxn id="21" idx="2"/>
+              <a:endCxn id="7" idx="0"/>
+            </p:cNvCxnSpPr>
+            <p:nvPr/>
+          </p:nvCxnSpPr>
+          <p:spPr>
+            <a:xfrm>
+              <a:off x="4105079" y="2819398"/>
+              <a:ext cx="2627" cy="1025084"/>
+            </a:xfrm>
+            <a:prstGeom prst="straightConnector1">
+              <a:avLst/>
+            </a:prstGeom>
+            <a:ln w="19050">
+              <a:solidFill>
+                <a:schemeClr val="tx1"/>
+              </a:solidFill>
+              <a:tailEnd type="arrow"/>
+            </a:ln>
+          </p:spPr>
+          <p:style>
+            <a:lnRef idx="1">
+              <a:schemeClr val="accent1"/>
+            </a:lnRef>
+            <a:fillRef idx="0">
+              <a:schemeClr val="accent1"/>
+            </a:fillRef>
+            <a:effectRef idx="0">
+              <a:schemeClr val="accent1"/>
+            </a:effectRef>
+            <a:fontRef idx="minor">
+              <a:schemeClr val="tx1"/>
+            </a:fontRef>
+          </p:style>
+        </p:cxnSp>
+        <p:cxnSp>
+          <p:nvCxnSpPr>
+            <p:cNvPr id="76" name="Elbow Connector 75"/>
+            <p:cNvCxnSpPr>
+              <a:stCxn id="11" idx="3"/>
+              <a:endCxn id="5" idx="3"/>
+            </p:cNvCxnSpPr>
+            <p:nvPr/>
+          </p:nvCxnSpPr>
+          <p:spPr>
+            <a:xfrm flipH="1">
+              <a:off x="5060206" y="2552698"/>
+              <a:ext cx="2434460" cy="2476503"/>
+            </a:xfrm>
+            <a:prstGeom prst="bentConnector3">
+              <a:avLst>
+                <a:gd name="adj1" fmla="val -18311"/>
+              </a:avLst>
+            </a:prstGeom>
+            <a:ln w="19050">
+              <a:solidFill>
+                <a:schemeClr val="tx1"/>
+              </a:solidFill>
+              <a:tailEnd type="arrow"/>
+            </a:ln>
+          </p:spPr>
+          <p:style>
+            <a:lnRef idx="1">
+              <a:schemeClr val="accent1"/>
+            </a:lnRef>
+            <a:fillRef idx="0">
+              <a:schemeClr val="accent1"/>
+            </a:fillRef>
+            <a:effectRef idx="0">
+              <a:schemeClr val="accent1"/>
+            </a:effectRef>
+            <a:fontRef idx="minor">
+              <a:schemeClr val="tx1"/>
+            </a:fontRef>
+          </p:style>
+        </p:cxnSp>
+        <p:cxnSp>
+          <p:nvCxnSpPr>
+            <p:cNvPr id="99" name="Elbow Connector 98"/>
+            <p:cNvCxnSpPr>
+              <a:stCxn id="21" idx="2"/>
+              <a:endCxn id="8" idx="0"/>
+            </p:cNvCxnSpPr>
+            <p:nvPr/>
+          </p:nvCxnSpPr>
+          <p:spPr>
+            <a:xfrm rot="16200000" flipH="1">
+              <a:off x="4767790" y="2156687"/>
+              <a:ext cx="1037896" cy="2363318"/>
+            </a:xfrm>
+            <a:prstGeom prst="bentConnector3">
+              <a:avLst>
+                <a:gd name="adj1" fmla="val 37886"/>
+              </a:avLst>
+            </a:prstGeom>
+            <a:ln w="19050">
+              <a:solidFill>
+                <a:schemeClr val="tx1"/>
+              </a:solidFill>
+              <a:tailEnd type="arrow"/>
+            </a:ln>
+          </p:spPr>
+          <p:style>
+            <a:lnRef idx="1">
+              <a:schemeClr val="accent1"/>
+            </a:lnRef>
+            <a:fillRef idx="0">
+              <a:schemeClr val="accent1"/>
+            </a:fillRef>
+            <a:effectRef idx="0">
+              <a:schemeClr val="accent1"/>
+            </a:effectRef>
+            <a:fontRef idx="minor">
+              <a:schemeClr val="tx1"/>
+            </a:fontRef>
+          </p:style>
+        </p:cxnSp>
+      </p:grpSp>
+    </p:spTree>
+    <p:extLst>
+      <p:ext uri="{BB962C8B-B14F-4D97-AF65-F5344CB8AC3E}">
+        <p14:creationId xmlns:p14="http://schemas.microsoft.com/office/powerpoint/2010/main" val="1938382874"/>
+      </p:ext>
+    </p:extLst>
+  </p:cSld>
+  <p:clrMapOvr>
+    <a:masterClrMapping/>
+  </p:clrMapOvr>
+</p:sld>
+</file>
+
 <file path=ppt/theme/theme1.xml><?xml version="1.0" encoding="utf-8"?>
 <a:theme xmlns:a="http://schemas.openxmlformats.org/drawingml/2006/main" name="Office Theme">
   <a:themeElements>

</xml_diff>